<commit_message>
edits to diagram and overview
</commit_message>
<xml_diff>
--- a/docs/images/architecture_diagram.pptx
+++ b/docs/images/architecture_diagram.pptx
@@ -14,11 +14,18 @@
   <p:notesSz cx="6858000" cy="9144000"/>
   <p:embeddedFontLst>
     <p:embeddedFont>
-      <p:font typeface="Consolas" panose="020B0609020204030204" pitchFamily="49" charset="0"/>
+      <p:font typeface="Amazon Ember" panose="020B0603020204020204" pitchFamily="34" charset="0"/>
       <p:regular r:id="rId4"/>
       <p:bold r:id="rId5"/>
       <p:italic r:id="rId6"/>
       <p:boldItalic r:id="rId7"/>
+    </p:embeddedFont>
+    <p:embeddedFont>
+      <p:font typeface="Consolas" panose="020B0609020204030204" pitchFamily="49" charset="0"/>
+      <p:regular r:id="rId8"/>
+      <p:bold r:id="rId9"/>
+      <p:italic r:id="rId10"/>
+      <p:boldItalic r:id="rId11"/>
     </p:embeddedFont>
   </p:embeddedFontLst>
   <p:defaultTextStyle>
@@ -5191,8 +5198,8 @@
         </p:nvSpPr>
         <p:spPr>
           <a:xfrm>
-            <a:off x="670050" y="986225"/>
-            <a:ext cx="6561779" cy="2224808"/>
+            <a:off x="670050" y="682871"/>
+            <a:ext cx="6561779" cy="2528162"/>
           </a:xfrm>
           <a:prstGeom prst="roundRect">
             <a:avLst>
@@ -5288,7 +5295,7 @@
         <p:spPr>
           <a:xfrm>
             <a:off x="4386296" y="2094827"/>
-            <a:ext cx="1625150" cy="0"/>
+            <a:ext cx="1666366" cy="0"/>
           </a:xfrm>
           <a:prstGeom prst="straightConnector1">
             <a:avLst/>
@@ -5316,8 +5323,8 @@
         </p:nvCxnSpPr>
         <p:spPr>
           <a:xfrm flipV="1">
-            <a:off x="2510002" y="2094827"/>
-            <a:ext cx="1276491" cy="988"/>
+            <a:off x="2510001" y="2094827"/>
+            <a:ext cx="1276492" cy="1"/>
           </a:xfrm>
           <a:prstGeom prst="bentConnector3">
             <a:avLst>
@@ -5408,7 +5415,7 @@
         </p:blipFill>
         <p:spPr>
           <a:xfrm>
-            <a:off x="1912171" y="1796902"/>
+            <a:off x="1912170" y="1795915"/>
             <a:ext cx="597831" cy="597825"/>
           </a:xfrm>
           <a:prstGeom prst="rect">
@@ -5436,7 +5443,7 @@
         </p:blipFill>
         <p:spPr>
           <a:xfrm>
-            <a:off x="6011446" y="1841125"/>
+            <a:off x="6052662" y="1841125"/>
             <a:ext cx="507406" cy="507404"/>
           </a:xfrm>
           <a:prstGeom prst="rect">
@@ -5466,7 +5473,7 @@
           <a:blip r:embed="rId7">
             <a:extLst>
               <a:ext uri="{96DAC541-7B7A-43D3-8B79-37D633B846F1}">
-                <asvg:svgBlip xmlns:asvg="http://schemas.microsoft.com/office/drawing/2016/SVG/main" r:embed="rId8"/>
+                <asvg:svgBlip xmlns:asvg="http://schemas.microsoft.com/office/drawing/2016/SVG/main" xmlns="" r:embed="rId8"/>
               </a:ext>
             </a:extLst>
           </a:blip>
@@ -5476,7 +5483,7 @@
         </p:blipFill>
         <p:spPr>
           <a:xfrm>
-            <a:off x="6396877" y="682871"/>
+            <a:off x="6031591" y="393075"/>
             <a:ext cx="549549" cy="549549"/>
           </a:xfrm>
           <a:prstGeom prst="rect">
@@ -5659,7 +5666,7 @@
             <a:blip r:embed="rId9">
               <a:extLst>
                 <a:ext uri="{96DAC541-7B7A-43D3-8B79-37D633B846F1}">
-                  <asvg:svgBlip xmlns:asvg="http://schemas.microsoft.com/office/drawing/2016/SVG/main" r:embed="rId10"/>
+                  <asvg:svgBlip xmlns:asvg="http://schemas.microsoft.com/office/drawing/2016/SVG/main" xmlns="" r:embed="rId10"/>
                 </a:ext>
               </a:extLst>
             </a:blip>
@@ -5692,7 +5699,7 @@
         </p:nvSpPr>
         <p:spPr>
           <a:xfrm>
-            <a:off x="1708490" y="2380332"/>
+            <a:off x="1708489" y="2430432"/>
             <a:ext cx="1005191" cy="290100"/>
           </a:xfrm>
           <a:prstGeom prst="rect">
@@ -5728,40 +5735,22 @@
               <a:t>C</a:t>
             </a:r>
             <a:r>
-              <a:rPr lang="fr" sz="900" dirty="0" err="1">
-                <a:latin typeface="Consolas"/>
-                <a:ea typeface="Consolas"/>
-                <a:cs typeface="Consolas"/>
-                <a:sym typeface="Consolas"/>
-              </a:rPr>
-              <a:t>lassic</a:t>
-            </a:r>
-            <a:r>
               <a:rPr lang="fr" sz="900" dirty="0">
                 <a:latin typeface="Consolas"/>
                 <a:ea typeface="Consolas"/>
                 <a:cs typeface="Consolas"/>
                 <a:sym typeface="Consolas"/>
               </a:rPr>
-              <a:t> </a:t>
+              <a:t>lassic </a:t>
             </a:r>
             <a:r>
-              <a:rPr lang="fr" sz="900" dirty="0" err="1">
+              <a:rPr lang="fr" sz="900" dirty="0" smtClean="0">
                 <a:latin typeface="Consolas"/>
                 <a:ea typeface="Consolas"/>
                 <a:cs typeface="Consolas"/>
                 <a:sym typeface="Consolas"/>
               </a:rPr>
-              <a:t>load</a:t>
-            </a:r>
-            <a:r>
-              <a:rPr lang="fr" sz="900" dirty="0">
-                <a:latin typeface="Consolas"/>
-                <a:ea typeface="Consolas"/>
-                <a:cs typeface="Consolas"/>
-                <a:sym typeface="Consolas"/>
-              </a:rPr>
-              <a:t> balancer</a:t>
+              <a:t>Load Balancer</a:t>
             </a:r>
             <a:endParaRPr sz="900" dirty="0">
               <a:latin typeface="Consolas"/>
@@ -5819,7 +5808,16 @@
                 <a:cs typeface="Consolas"/>
                 <a:sym typeface="Consolas"/>
               </a:rPr>
-              <a:t>EBS Volume</a:t>
+              <a:t>EBS </a:t>
+            </a:r>
+            <a:r>
+              <a:rPr lang="en-US" sz="900" dirty="0" smtClean="0">
+                <a:latin typeface="Consolas"/>
+                <a:ea typeface="Consolas"/>
+                <a:cs typeface="Consolas"/>
+                <a:sym typeface="Consolas"/>
+              </a:rPr>
+              <a:t>volume</a:t>
             </a:r>
             <a:endParaRPr sz="900" dirty="0">
               <a:latin typeface="Consolas"/>
@@ -6188,6 +6186,167 @@
               <a:cs typeface="Consolas"/>
               <a:sym typeface="Consolas"/>
             </a:endParaRPr>
+          </a:p>
+        </p:txBody>
+      </p:sp>
+      <p:sp>
+        <p:nvSpPr>
+          <p:cNvPr id="26" name="TextBox 9">
+            <a:extLst>
+              <a:ext uri="{FF2B5EF4-FFF2-40B4-BE49-F238E27FC236}">
+                <a16:creationId xmlns:a16="http://schemas.microsoft.com/office/drawing/2014/main" id="{5A05B158-B70B-5F4F-B0E2-17894FAAF34C}"/>
+              </a:ext>
+            </a:extLst>
+          </p:cNvPr>
+          <p:cNvSpPr txBox="1">
+            <a:spLocks noChangeArrowheads="1"/>
+          </p:cNvSpPr>
+          <p:nvPr/>
+        </p:nvSpPr>
+        <p:spPr bwMode="auto">
+          <a:xfrm>
+            <a:off x="5232916" y="932988"/>
+            <a:ext cx="2268538" cy="369332"/>
+          </a:xfrm>
+          <a:prstGeom prst="rect">
+            <a:avLst/>
+          </a:prstGeom>
+          <a:noFill/>
+          <a:ln>
+            <a:noFill/>
+          </a:ln>
+          <a:extLst>
+            <a:ext uri="{909E8E84-426E-40DD-AFC4-6F175D3DCCD1}">
+              <a14:hiddenFill xmlns:a14="http://schemas.microsoft.com/office/drawing/2010/main">
+                <a:solidFill>
+                  <a:srgbClr val="FFFFFF"/>
+                </a:solidFill>
+              </a14:hiddenFill>
+            </a:ext>
+            <a:ext uri="{91240B29-F687-4F45-9708-019B960494DF}">
+              <a14:hiddenLine xmlns:a14="http://schemas.microsoft.com/office/drawing/2010/main" w="9525">
+                <a:solidFill>
+                  <a:srgbClr val="000000"/>
+                </a:solidFill>
+                <a:miter lim="800000"/>
+                <a:headEnd/>
+                <a:tailEnd/>
+              </a14:hiddenLine>
+            </a:ext>
+          </a:extLst>
+        </p:spPr>
+        <p:txBody>
+          <a:bodyPr wrap="square">
+            <a:spAutoFit/>
+          </a:bodyPr>
+          <a:lstStyle>
+            <a:lvl1pPr>
+              <a:defRPr>
+                <a:solidFill>
+                  <a:schemeClr val="tx1"/>
+                </a:solidFill>
+                <a:latin typeface="Calibri" panose="020F0502020204030204" pitchFamily="34" charset="0"/>
+              </a:defRPr>
+            </a:lvl1pPr>
+            <a:lvl2pPr marL="742950" indent="-285750">
+              <a:defRPr>
+                <a:solidFill>
+                  <a:schemeClr val="tx1"/>
+                </a:solidFill>
+                <a:latin typeface="Calibri" panose="020F0502020204030204" pitchFamily="34" charset="0"/>
+              </a:defRPr>
+            </a:lvl2pPr>
+            <a:lvl3pPr marL="1143000" indent="-228600">
+              <a:defRPr>
+                <a:solidFill>
+                  <a:schemeClr val="tx1"/>
+                </a:solidFill>
+                <a:latin typeface="Calibri" panose="020F0502020204030204" pitchFamily="34" charset="0"/>
+              </a:defRPr>
+            </a:lvl3pPr>
+            <a:lvl4pPr marL="1600200" indent="-228600">
+              <a:defRPr>
+                <a:solidFill>
+                  <a:schemeClr val="tx1"/>
+                </a:solidFill>
+                <a:latin typeface="Calibri" panose="020F0502020204030204" pitchFamily="34" charset="0"/>
+              </a:defRPr>
+            </a:lvl4pPr>
+            <a:lvl5pPr marL="2057400" indent="-228600">
+              <a:defRPr>
+                <a:solidFill>
+                  <a:schemeClr val="tx1"/>
+                </a:solidFill>
+                <a:latin typeface="Calibri" panose="020F0502020204030204" pitchFamily="34" charset="0"/>
+              </a:defRPr>
+            </a:lvl5pPr>
+            <a:lvl6pPr marL="2514600" indent="-228600" eaLnBrk="0" fontAlgn="base" hangingPunct="0">
+              <a:spcBef>
+                <a:spcPct val="0"/>
+              </a:spcBef>
+              <a:spcAft>
+                <a:spcPct val="0"/>
+              </a:spcAft>
+              <a:defRPr>
+                <a:solidFill>
+                  <a:schemeClr val="tx1"/>
+                </a:solidFill>
+                <a:latin typeface="Calibri" panose="020F0502020204030204" pitchFamily="34" charset="0"/>
+              </a:defRPr>
+            </a:lvl6pPr>
+            <a:lvl7pPr marL="2971800" indent="-228600" eaLnBrk="0" fontAlgn="base" hangingPunct="0">
+              <a:spcBef>
+                <a:spcPct val="0"/>
+              </a:spcBef>
+              <a:spcAft>
+                <a:spcPct val="0"/>
+              </a:spcAft>
+              <a:defRPr>
+                <a:solidFill>
+                  <a:schemeClr val="tx1"/>
+                </a:solidFill>
+                <a:latin typeface="Calibri" panose="020F0502020204030204" pitchFamily="34" charset="0"/>
+              </a:defRPr>
+            </a:lvl7pPr>
+            <a:lvl8pPr marL="3429000" indent="-228600" eaLnBrk="0" fontAlgn="base" hangingPunct="0">
+              <a:spcBef>
+                <a:spcPct val="0"/>
+              </a:spcBef>
+              <a:spcAft>
+                <a:spcPct val="0"/>
+              </a:spcAft>
+              <a:defRPr>
+                <a:solidFill>
+                  <a:schemeClr val="tx1"/>
+                </a:solidFill>
+                <a:latin typeface="Calibri" panose="020F0502020204030204" pitchFamily="34" charset="0"/>
+              </a:defRPr>
+            </a:lvl8pPr>
+            <a:lvl9pPr marL="3886200" indent="-228600" eaLnBrk="0" fontAlgn="base" hangingPunct="0">
+              <a:spcBef>
+                <a:spcPct val="0"/>
+              </a:spcBef>
+              <a:spcAft>
+                <a:spcPct val="0"/>
+              </a:spcAft>
+              <a:defRPr>
+                <a:solidFill>
+                  <a:schemeClr val="tx1"/>
+                </a:solidFill>
+                <a:latin typeface="Calibri" panose="020F0502020204030204" pitchFamily="34" charset="0"/>
+              </a:defRPr>
+            </a:lvl9pPr>
+          </a:lstStyle>
+          <a:p>
+            <a:pPr algn="ctr" eaLnBrk="1" hangingPunct="1"/>
+            <a:r>
+              <a:rPr lang="en-US" altLang="en-US" sz="900" dirty="0">
+                <a:latin typeface="Consolas" panose="020B0609020204030204" pitchFamily="49" charset="0"/>
+                <a:ea typeface="Amazon Ember" panose="020B0603020204020204" pitchFamily="34" charset="0"/>
+                <a:cs typeface="Arial" panose="020B0604020202020204" pitchFamily="34" charset="0"/>
+              </a:rPr>
+              <a:t>Amazon Elastic Kubernetes Service (Amazon EKS)</a:t>
+            </a:r>
           </a:p>
         </p:txBody>
       </p:sp>

</xml_diff>